<commit_message>
Some last minute changes.
git-svn-id: https://jamoma.svn.sourceforge.net/svnroot/jamoma/branches/active@6007 464221e2-0a0f-0410-983b-f8d57d210c17
</commit_message>
<xml_diff>
--- a/Papers/ICMC2009-dbap/presentation/presentation.pptx
+++ b/Papers/ICMC2009-dbap/presentation/presentation.pptx
@@ -18,12 +18,14 @@
     <p:sldId id="274" r:id="rId12"/>
     <p:sldId id="275" r:id="rId13"/>
     <p:sldId id="276" r:id="rId14"/>
-    <p:sldId id="266" r:id="rId15"/>
-    <p:sldId id="269" r:id="rId16"/>
-    <p:sldId id="268" r:id="rId17"/>
-    <p:sldId id="278" r:id="rId18"/>
-    <p:sldId id="277" r:id="rId19"/>
-    <p:sldId id="262" r:id="rId20"/>
+    <p:sldId id="279" r:id="rId15"/>
+    <p:sldId id="266" r:id="rId16"/>
+    <p:sldId id="269" r:id="rId17"/>
+    <p:sldId id="268" r:id="rId18"/>
+    <p:sldId id="278" r:id="rId19"/>
+    <p:sldId id="280" r:id="rId20"/>
+    <p:sldId id="277" r:id="rId21"/>
+    <p:sldId id="262" r:id="rId22"/>
   </p:sldIdLst>
   <p:sldSz cx="9144000" cy="6858000" type="screen4x3"/>
   <p:notesSz cx="6858000" cy="9144000"/>
@@ -3317,15 +3319,7 @@
           <a:p>
             <a:r>
               <a:rPr lang="nn-NO" dirty="0" err="1" smtClean="0"/>
-              <a:t>Th</a:t>
-            </a:r>
-            <a:r>
-              <a:rPr lang="nn-NO" dirty="0" err="1" smtClean="0"/>
-              <a:t>é</a:t>
-            </a:r>
-            <a:r>
-              <a:rPr lang="nn-NO" dirty="0" err="1" smtClean="0"/>
-              <a:t>o</a:t>
+              <a:t>Théo</a:t>
             </a:r>
             <a:r>
               <a:rPr lang="nn-NO" dirty="0" smtClean="0"/>
@@ -3751,6 +3745,73 @@
           <a:p>
             <a:r>
               <a:rPr lang="nn-NO" dirty="0" err="1" smtClean="0"/>
+              <a:t>Demo</a:t>
+            </a:r>
+            <a:endParaRPr lang="nn-NO" dirty="0"/>
+          </a:p>
+        </p:txBody>
+      </p:sp>
+      <p:sp>
+        <p:nvSpPr>
+          <p:cNvPr id="3" name="Plassholder for innhold 2"/>
+          <p:cNvSpPr>
+            <a:spLocks noGrp="1"/>
+          </p:cNvSpPr>
+          <p:nvPr>
+            <p:ph idx="1"/>
+          </p:nvPr>
+        </p:nvSpPr>
+        <p:spPr/>
+        <p:txBody>
+          <a:bodyPr/>
+          <a:lstStyle/>
+          <a:p>
+            <a:endParaRPr lang="nn-NO" dirty="0"/>
+          </a:p>
+        </p:txBody>
+      </p:sp>
+    </p:spTree>
+  </p:cSld>
+  <p:clrMapOvr>
+    <a:masterClrMapping/>
+  </p:clrMapOvr>
+</p:sld>
+</file>
+
+<file path=ppt/slides/slide15.xml><?xml version="1.0" encoding="utf-8"?>
+<p:sld xmlns:a="http://schemas.openxmlformats.org/drawingml/2006/main" xmlns:r="http://schemas.openxmlformats.org/officeDocument/2006/relationships" xmlns:mc="http://schemas.openxmlformats.org/markup-compatibility/2006" xmlns:mv="urn:schemas-microsoft-com:mac:vml" xmlns:p="http://schemas.openxmlformats.org/presentationml/2006/main" mc:Ignorable="mv" mc:PreserveAttributes="mv:*">
+  <p:cSld>
+    <p:spTree>
+      <p:nvGrpSpPr>
+        <p:cNvPr id="1" name=""/>
+        <p:cNvGrpSpPr/>
+        <p:nvPr/>
+      </p:nvGrpSpPr>
+      <p:grpSpPr>
+        <a:xfrm>
+          <a:off x="0" y="0"/>
+          <a:ext cx="0" cy="0"/>
+          <a:chOff x="0" y="0"/>
+          <a:chExt cx="0" cy="0"/>
+        </a:xfrm>
+      </p:grpSpPr>
+      <p:sp>
+        <p:nvSpPr>
+          <p:cNvPr id="2" name="Tittel 1"/>
+          <p:cNvSpPr>
+            <a:spLocks noGrp="1"/>
+          </p:cNvSpPr>
+          <p:nvPr>
+            <p:ph type="title"/>
+          </p:nvPr>
+        </p:nvSpPr>
+        <p:spPr/>
+        <p:txBody>
+          <a:bodyPr/>
+          <a:lstStyle/>
+          <a:p>
+            <a:r>
+              <a:rPr lang="nn-NO" dirty="0" err="1" smtClean="0"/>
               <a:t>Discussion</a:t>
             </a:r>
             <a:endParaRPr lang="nn-NO" dirty="0"/>
@@ -3964,7 +4025,7 @@
 </p:sld>
 </file>
 
-<file path=ppt/slides/slide15.xml><?xml version="1.0" encoding="utf-8"?>
+<file path=ppt/slides/slide16.xml><?xml version="1.0" encoding="utf-8"?>
 <p:sld xmlns:a="http://schemas.openxmlformats.org/drawingml/2006/main" xmlns:r="http://schemas.openxmlformats.org/officeDocument/2006/relationships" xmlns:mc="http://schemas.openxmlformats.org/markup-compatibility/2006" xmlns:mv="urn:schemas-microsoft-com:mac:vml" xmlns:p="http://schemas.openxmlformats.org/presentationml/2006/main" mc:Ignorable="mv" mc:PreserveAttributes="mv:*">
   <p:cSld>
     <p:spTree>
@@ -4020,7 +4081,7 @@
 </p:sld>
 </file>
 
-<file path=ppt/slides/slide16.xml><?xml version="1.0" encoding="utf-8"?>
+<file path=ppt/slides/slide17.xml><?xml version="1.0" encoding="utf-8"?>
 <p:sld xmlns:a="http://schemas.openxmlformats.org/drawingml/2006/main" xmlns:r="http://schemas.openxmlformats.org/officeDocument/2006/relationships" xmlns:mc="http://schemas.openxmlformats.org/markup-compatibility/2006" xmlns:mv="urn:schemas-microsoft-com:mac:vml" xmlns:p="http://schemas.openxmlformats.org/presentationml/2006/main" mc:Ignorable="mv" mc:PreserveAttributes="mv:*">
   <p:cSld>
     <p:spTree>
@@ -4076,7 +4137,7 @@
 </p:sld>
 </file>
 
-<file path=ppt/slides/slide17.xml><?xml version="1.0" encoding="utf-8"?>
+<file path=ppt/slides/slide18.xml><?xml version="1.0" encoding="utf-8"?>
 <p:sld xmlns:a="http://schemas.openxmlformats.org/drawingml/2006/main" xmlns:r="http://schemas.openxmlformats.org/officeDocument/2006/relationships" xmlns:mc="http://schemas.openxmlformats.org/markup-compatibility/2006" xmlns:mv="urn:schemas-microsoft-com:mac:vml" xmlns:p="http://schemas.openxmlformats.org/presentationml/2006/main" mc:Ignorable="mv" mc:PreserveAttributes="mv:*">
   <p:cSld>
     <p:spTree>
@@ -4155,7 +4216,188 @@
 </p:sld>
 </file>
 
-<file path=ppt/slides/slide18.xml><?xml version="1.0" encoding="utf-8"?>
+<file path=ppt/slides/slide19.xml><?xml version="1.0" encoding="utf-8"?>
+<p:sld xmlns:a="http://schemas.openxmlformats.org/drawingml/2006/main" xmlns:r="http://schemas.openxmlformats.org/officeDocument/2006/relationships" xmlns:mc="http://schemas.openxmlformats.org/markup-compatibility/2006" xmlns:mv="urn:schemas-microsoft-com:mac:vml" xmlns:p="http://schemas.openxmlformats.org/presentationml/2006/main" mc:Ignorable="mv" mc:PreserveAttributes="mv:*">
+  <p:cSld>
+    <p:spTree>
+      <p:nvGrpSpPr>
+        <p:cNvPr id="1" name=""/>
+        <p:cNvGrpSpPr/>
+        <p:nvPr/>
+      </p:nvGrpSpPr>
+      <p:grpSpPr>
+        <a:xfrm>
+          <a:off x="0" y="0"/>
+          <a:ext cx="0" cy="0"/>
+          <a:chOff x="0" y="0"/>
+          <a:chExt cx="0" cy="0"/>
+        </a:xfrm>
+      </p:grpSpPr>
+      <p:sp>
+        <p:nvSpPr>
+          <p:cNvPr id="2" name="Tittel 1"/>
+          <p:cNvSpPr>
+            <a:spLocks noGrp="1"/>
+          </p:cNvSpPr>
+          <p:nvPr>
+            <p:ph type="title"/>
+          </p:nvPr>
+        </p:nvSpPr>
+        <p:spPr/>
+        <p:txBody>
+          <a:bodyPr/>
+          <a:lstStyle/>
+          <a:p>
+            <a:r>
+              <a:rPr lang="nn-NO" dirty="0" smtClean="0"/>
+              <a:t>Spatial </a:t>
+            </a:r>
+            <a:r>
+              <a:rPr lang="nn-NO" dirty="0" err="1" smtClean="0"/>
+              <a:t>interpolation</a:t>
+            </a:r>
+            <a:r>
+              <a:rPr lang="nn-NO" dirty="0" smtClean="0"/>
+              <a:t> </a:t>
+            </a:r>
+            <a:r>
+              <a:rPr lang="nn-NO" dirty="0" err="1" smtClean="0"/>
+              <a:t>between</a:t>
+            </a:r>
+            <a:r>
+              <a:rPr lang="nn-NO" dirty="0" smtClean="0"/>
+              <a:t> </a:t>
+            </a:r>
+            <a:r>
+              <a:rPr lang="nn-NO" dirty="0" err="1" smtClean="0"/>
+              <a:t>presets</a:t>
+            </a:r>
+            <a:endParaRPr lang="nn-NO" dirty="0"/>
+          </a:p>
+        </p:txBody>
+      </p:sp>
+      <p:pic>
+        <p:nvPicPr>
+          <p:cNvPr id="4" name="Plassholder for innhold 3" descr="interpolatePresets.png"/>
+          <p:cNvPicPr>
+            <a:picLocks noGrp="1" noChangeAspect="1"/>
+          </p:cNvPicPr>
+          <p:nvPr>
+            <p:ph idx="1"/>
+          </p:nvPr>
+        </p:nvPicPr>
+        <p:blipFill>
+          <a:blip r:embed="rId2"/>
+          <a:srcRect l="-44444" r="-44444"/>
+          <a:stretch>
+            <a:fillRect/>
+          </a:stretch>
+        </p:blipFill>
+        <p:spPr>
+          <a:xfrm>
+            <a:off x="254000" y="1752600"/>
+            <a:ext cx="8636000" cy="4572000"/>
+          </a:xfrm>
+        </p:spPr>
+      </p:pic>
+    </p:spTree>
+  </p:cSld>
+  <p:clrMapOvr>
+    <a:masterClrMapping/>
+  </p:clrMapOvr>
+  <p:timing>
+    <p:tnLst>
+      <p:par>
+        <p:cTn id="1" dur="indefinite" restart="never" nodeType="tmRoot"/>
+      </p:par>
+    </p:tnLst>
+  </p:timing>
+</p:sld>
+</file>
+
+<file path=ppt/slides/slide2.xml><?xml version="1.0" encoding="utf-8"?>
+<p:sld xmlns:a="http://schemas.openxmlformats.org/drawingml/2006/main" xmlns:r="http://schemas.openxmlformats.org/officeDocument/2006/relationships" xmlns:mc="http://schemas.openxmlformats.org/markup-compatibility/2006" xmlns:mv="urn:schemas-microsoft-com:mac:vml" xmlns:p="http://schemas.openxmlformats.org/presentationml/2006/main" mc:Ignorable="mv" mc:PreserveAttributes="mv:*">
+  <p:cSld>
+    <p:spTree>
+      <p:nvGrpSpPr>
+        <p:cNvPr id="1" name=""/>
+        <p:cNvGrpSpPr/>
+        <p:nvPr/>
+      </p:nvGrpSpPr>
+      <p:grpSpPr>
+        <a:xfrm>
+          <a:off x="0" y="0"/>
+          <a:ext cx="0" cy="0"/>
+          <a:chOff x="0" y="0"/>
+          <a:chExt cx="0" cy="0"/>
+        </a:xfrm>
+      </p:grpSpPr>
+      <p:sp>
+        <p:nvSpPr>
+          <p:cNvPr id="2" name="Tittel 1"/>
+          <p:cNvSpPr>
+            <a:spLocks noGrp="1"/>
+          </p:cNvSpPr>
+          <p:nvPr>
+            <p:ph type="title"/>
+          </p:nvPr>
+        </p:nvSpPr>
+        <p:spPr/>
+        <p:txBody>
+          <a:bodyPr/>
+          <a:lstStyle/>
+          <a:p>
+            <a:r>
+              <a:rPr lang="nn-NO" dirty="0" smtClean="0"/>
+              <a:t>ITU 5.1 </a:t>
+            </a:r>
+            <a:r>
+              <a:rPr lang="nn-NO" dirty="0" err="1"/>
+              <a:t>S</a:t>
+            </a:r>
+            <a:r>
+              <a:rPr lang="nn-NO" dirty="0" err="1" smtClean="0"/>
+              <a:t>urround</a:t>
+            </a:r>
+            <a:endParaRPr lang="nn-NO" dirty="0"/>
+          </a:p>
+        </p:txBody>
+      </p:sp>
+      <p:pic>
+        <p:nvPicPr>
+          <p:cNvPr id="4" name="Plassholder for innhold 3" descr="itu5.1.png"/>
+          <p:cNvPicPr>
+            <a:picLocks noGrp="1" noChangeAspect="1"/>
+          </p:cNvPicPr>
+          <p:nvPr>
+            <p:ph idx="1"/>
+          </p:nvPr>
+        </p:nvPicPr>
+        <p:blipFill>
+          <a:blip r:embed="rId2"/>
+          <a:srcRect l="-44444" r="-44444"/>
+          <a:stretch>
+            <a:fillRect/>
+          </a:stretch>
+        </p:blipFill>
+        <p:spPr/>
+      </p:pic>
+    </p:spTree>
+  </p:cSld>
+  <p:clrMapOvr>
+    <a:masterClrMapping/>
+  </p:clrMapOvr>
+  <p:timing>
+    <p:tnLst>
+      <p:par>
+        <p:cTn id="1" dur="indefinite" restart="never" nodeType="tmRoot"/>
+      </p:par>
+    </p:tnLst>
+  </p:timing>
+</p:sld>
+</file>
+
+<file path=ppt/slides/slide20.xml><?xml version="1.0" encoding="utf-8"?>
 <p:sld xmlns:a="http://schemas.openxmlformats.org/drawingml/2006/main" xmlns:r="http://schemas.openxmlformats.org/officeDocument/2006/relationships" xmlns:mc="http://schemas.openxmlformats.org/markup-compatibility/2006" xmlns:mv="urn:schemas-microsoft-com:mac:vml" xmlns:p="http://schemas.openxmlformats.org/presentationml/2006/main" mc:Ignorable="mv" mc:PreserveAttributes="mv:*">
   <p:cSld>
     <p:spTree>
@@ -4211,7 +4453,7 @@
 </p:sld>
 </file>
 
-<file path=ppt/slides/slide19.xml><?xml version="1.0" encoding="utf-8"?>
+<file path=ppt/slides/slide21.xml><?xml version="1.0" encoding="utf-8"?>
 <p:sld xmlns:a="http://schemas.openxmlformats.org/drawingml/2006/main" xmlns:r="http://schemas.openxmlformats.org/officeDocument/2006/relationships" xmlns:mc="http://schemas.openxmlformats.org/markup-compatibility/2006" xmlns:mv="urn:schemas-microsoft-com:mac:vml" xmlns:p="http://schemas.openxmlformats.org/presentationml/2006/main" mc:Ignorable="mv" mc:PreserveAttributes="mv:*">
   <p:cSld>
     <p:spTree>
@@ -4279,11 +4521,7 @@
           <a:p>
             <a:r>
               <a:rPr lang="nn-NO" dirty="0" smtClean="0"/>
-              <a:t>Andr</a:t>
-            </a:r>
-            <a:r>
-              <a:rPr lang="nn-NO" dirty="0" smtClean="0"/>
-              <a:t>é </a:t>
+              <a:t>André </a:t>
             </a:r>
             <a:r>
               <a:rPr lang="nn-NO" dirty="0" err="1" smtClean="0"/>
@@ -4381,88 +4619,6 @@
           </a:p>
         </p:txBody>
       </p:sp>
-    </p:spTree>
-  </p:cSld>
-  <p:clrMapOvr>
-    <a:masterClrMapping/>
-  </p:clrMapOvr>
-  <p:timing>
-    <p:tnLst>
-      <p:par>
-        <p:cTn id="1" dur="indefinite" restart="never" nodeType="tmRoot"/>
-      </p:par>
-    </p:tnLst>
-  </p:timing>
-</p:sld>
-</file>
-
-<file path=ppt/slides/slide2.xml><?xml version="1.0" encoding="utf-8"?>
-<p:sld xmlns:a="http://schemas.openxmlformats.org/drawingml/2006/main" xmlns:r="http://schemas.openxmlformats.org/officeDocument/2006/relationships" xmlns:mc="http://schemas.openxmlformats.org/markup-compatibility/2006" xmlns:mv="urn:schemas-microsoft-com:mac:vml" xmlns:p="http://schemas.openxmlformats.org/presentationml/2006/main" mc:Ignorable="mv" mc:PreserveAttributes="mv:*">
-  <p:cSld>
-    <p:spTree>
-      <p:nvGrpSpPr>
-        <p:cNvPr id="1" name=""/>
-        <p:cNvGrpSpPr/>
-        <p:nvPr/>
-      </p:nvGrpSpPr>
-      <p:grpSpPr>
-        <a:xfrm>
-          <a:off x="0" y="0"/>
-          <a:ext cx="0" cy="0"/>
-          <a:chOff x="0" y="0"/>
-          <a:chExt cx="0" cy="0"/>
-        </a:xfrm>
-      </p:grpSpPr>
-      <p:sp>
-        <p:nvSpPr>
-          <p:cNvPr id="2" name="Tittel 1"/>
-          <p:cNvSpPr>
-            <a:spLocks noGrp="1"/>
-          </p:cNvSpPr>
-          <p:nvPr>
-            <p:ph type="title"/>
-          </p:nvPr>
-        </p:nvSpPr>
-        <p:spPr/>
-        <p:txBody>
-          <a:bodyPr/>
-          <a:lstStyle/>
-          <a:p>
-            <a:r>
-              <a:rPr lang="nn-NO" dirty="0" smtClean="0"/>
-              <a:t>ITU 5.1 </a:t>
-            </a:r>
-            <a:r>
-              <a:rPr lang="nn-NO" dirty="0" err="1"/>
-              <a:t>S</a:t>
-            </a:r>
-            <a:r>
-              <a:rPr lang="nn-NO" dirty="0" err="1" smtClean="0"/>
-              <a:t>urround</a:t>
-            </a:r>
-            <a:endParaRPr lang="nn-NO" dirty="0"/>
-          </a:p>
-        </p:txBody>
-      </p:sp>
-      <p:pic>
-        <p:nvPicPr>
-          <p:cNvPr id="4" name="Plassholder for innhold 3" descr="itu5.1.png"/>
-          <p:cNvPicPr>
-            <a:picLocks noGrp="1" noChangeAspect="1"/>
-          </p:cNvPicPr>
-          <p:nvPr>
-            <p:ph idx="1"/>
-          </p:nvPr>
-        </p:nvPicPr>
-        <p:blipFill>
-          <a:blip r:embed="rId2"/>
-          <a:srcRect l="-44444" r="-44444"/>
-          <a:stretch>
-            <a:fillRect/>
-          </a:stretch>
-        </p:blipFill>
-        <p:spPr/>
-      </p:pic>
     </p:spTree>
   </p:cSld>
   <p:clrMapOvr>
@@ -5067,16 +5223,17 @@
             </a:r>
             <a:r>
               <a:rPr lang="nn-NO" dirty="0" smtClean="0"/>
-              <a:t> speaker </a:t>
-            </a:r>
-            <a:r>
-              <a:rPr lang="nn-NO" i="1" dirty="0" smtClean="0"/>
-              <a:t>i</a:t>
+              <a:t> </a:t>
+            </a:r>
+            <a:r>
+              <a:rPr lang="nn-NO" dirty="0" err="1" smtClean="0"/>
+              <a:t>each</a:t>
             </a:r>
             <a:r>
               <a:rPr lang="nn-NO" dirty="0" smtClean="0"/>
-              <a:t> :</a:t>
-            </a:r>
+              <a:t> speaker:</a:t>
+            </a:r>
+            <a:endParaRPr lang="nn-NO" dirty="0" smtClean="0"/>
           </a:p>
           <a:p>
             <a:endParaRPr lang="nn-NO" dirty="0" smtClean="0"/>

</xml_diff>

<commit_message>
Last minute (litterary) changes.
git-svn-id: https://jamoma.svn.sourceforge.net/svnroot/jamoma/branches/active@6008 464221e2-0a0f-0410-983b-f8d57d210c17
</commit_message>
<xml_diff>
--- a/Papers/ICMC2009-dbap/presentation/presentation.pptx
+++ b/Papers/ICMC2009-dbap/presentation/presentation.pptx
@@ -3745,27 +3745,56 @@
           <a:p>
             <a:r>
               <a:rPr lang="nn-NO" dirty="0" err="1" smtClean="0"/>
+              <a:t>Implementation</a:t>
+            </a:r>
+            <a:endParaRPr lang="nn-NO" dirty="0"/>
+          </a:p>
+        </p:txBody>
+      </p:sp>
+      <p:sp>
+        <p:nvSpPr>
+          <p:cNvPr id="3" name="Plassholder for innhold 2"/>
+          <p:cNvSpPr>
+            <a:spLocks noGrp="1"/>
+          </p:cNvSpPr>
+          <p:nvPr>
+            <p:ph idx="1"/>
+          </p:nvPr>
+        </p:nvSpPr>
+        <p:spPr/>
+        <p:txBody>
+          <a:bodyPr/>
+          <a:lstStyle/>
+          <a:p>
+            <a:r>
+              <a:rPr lang="nn-NO" dirty="0" smtClean="0"/>
+              <a:t>Max and </a:t>
+            </a:r>
+            <a:r>
+              <a:rPr lang="nn-NO" dirty="0" err="1" smtClean="0"/>
+              <a:t>Jamoma</a:t>
+            </a:r>
+            <a:endParaRPr lang="nn-NO" dirty="0" smtClean="0"/>
+          </a:p>
+          <a:p>
+            <a:r>
+              <a:rPr lang="nn-NO" dirty="0" err="1" smtClean="0"/>
+              <a:t>Visualization</a:t>
+            </a:r>
+            <a:endParaRPr lang="nn-NO" dirty="0" smtClean="0"/>
+          </a:p>
+          <a:p>
+            <a:endParaRPr lang="nn-NO" dirty="0" smtClean="0"/>
+          </a:p>
+          <a:p>
+            <a:r>
+              <a:rPr lang="nn-NO" dirty="0" err="1" smtClean="0"/>
               <a:t>Demo</a:t>
             </a:r>
-            <a:endParaRPr lang="nn-NO" dirty="0"/>
-          </a:p>
-        </p:txBody>
-      </p:sp>
-      <p:sp>
-        <p:nvSpPr>
-          <p:cNvPr id="3" name="Plassholder for innhold 2"/>
-          <p:cNvSpPr>
-            <a:spLocks noGrp="1"/>
-          </p:cNvSpPr>
-          <p:nvPr>
-            <p:ph idx="1"/>
-          </p:nvPr>
-        </p:nvSpPr>
-        <p:spPr/>
-        <p:txBody>
-          <a:bodyPr/>
-          <a:lstStyle/>
-          <a:p>
+            <a:r>
+              <a:rPr lang="nn-NO" dirty="0" smtClean="0"/>
+              <a:t> !</a:t>
+            </a:r>
             <a:endParaRPr lang="nn-NO" dirty="0"/>
           </a:p>
         </p:txBody>
@@ -3775,6 +3804,13 @@
   <p:clrMapOvr>
     <a:masterClrMapping/>
   </p:clrMapOvr>
+  <p:timing>
+    <p:tnLst>
+      <p:par>
+        <p:cTn id="1" dur="indefinite" restart="never" nodeType="tmRoot"/>
+      </p:par>
+    </p:tnLst>
+  </p:timing>
 </p:sld>
 </file>
 
@@ -3839,8 +3875,12 @@
           <a:lstStyle/>
           <a:p>
             <a:r>
-              <a:rPr lang="nn-NO" dirty="0" smtClean="0"/>
-              <a:t>DBAP</a:t>
+              <a:rPr lang="nn-NO" dirty="0" err="1" smtClean="0"/>
+              <a:t>Summary</a:t>
+            </a:r>
+            <a:r>
+              <a:rPr lang="nn-NO" dirty="0" smtClean="0"/>
+              <a:t> :</a:t>
             </a:r>
           </a:p>
           <a:p>
@@ -3937,8 +3977,9 @@
             </a:r>
             <a:r>
               <a:rPr lang="nn-NO" dirty="0" smtClean="0"/>
-              <a:t>:</a:t>
-            </a:r>
+              <a:t> :</a:t>
+            </a:r>
+            <a:endParaRPr lang="nn-NO" dirty="0" smtClean="0"/>
           </a:p>
           <a:p>
             <a:pPr lvl="1"/>
@@ -4002,8 +4043,13 @@
             </a:r>
             <a:r>
               <a:rPr lang="nn-NO" dirty="0" smtClean="0"/>
-              <a:t> uses:</a:t>
-            </a:r>
+              <a:t> </a:t>
+            </a:r>
+            <a:r>
+              <a:rPr lang="nn-NO" dirty="0" smtClean="0"/>
+              <a:t>uses :</a:t>
+            </a:r>
+            <a:endParaRPr lang="nn-NO" dirty="0" smtClean="0"/>
           </a:p>
           <a:p>
             <a:endParaRPr lang="nn-NO" dirty="0"/>
@@ -5233,7 +5279,6 @@
               <a:rPr lang="nn-NO" dirty="0" smtClean="0"/>
               <a:t> speaker:</a:t>
             </a:r>
-            <a:endParaRPr lang="nn-NO" dirty="0" smtClean="0"/>
           </a:p>
           <a:p>
             <a:endParaRPr lang="nn-NO" dirty="0" smtClean="0"/>

</xml_diff>